<commit_message>
quickedit: changed icons to XAML icons; updated help file
</commit_message>
<xml_diff>
--- a/features/ppt_quickedit/resources/QuickEdit Help.pptx
+++ b/features/ppt_quickedit/resources/QuickEdit Help.pptx
@@ -247,7 +247,7 @@
           <a:p>
             <a:fld id="{DA3DEE59-56D5-4275-8334-F499AD119299}" type="datetimeFigureOut">
               <a:rPr lang="en-US" smtClean="0"/>
-              <a:t>4/4/2019</a:t>
+              <a:t>4/11/2019</a:t>
             </a:fld>
             <a:endParaRPr lang="en-US"/>
           </a:p>
@@ -417,7 +417,7 @@
           <a:p>
             <a:fld id="{DA3DEE59-56D5-4275-8334-F499AD119299}" type="datetimeFigureOut">
               <a:rPr lang="en-US" smtClean="0"/>
-              <a:t>4/4/2019</a:t>
+              <a:t>4/11/2019</a:t>
             </a:fld>
             <a:endParaRPr lang="en-US"/>
           </a:p>
@@ -597,7 +597,7 @@
           <a:p>
             <a:fld id="{DA3DEE59-56D5-4275-8334-F499AD119299}" type="datetimeFigureOut">
               <a:rPr lang="en-US" smtClean="0"/>
-              <a:t>4/4/2019</a:t>
+              <a:t>4/11/2019</a:t>
             </a:fld>
             <a:endParaRPr lang="en-US"/>
           </a:p>
@@ -767,7 +767,7 @@
           <a:p>
             <a:fld id="{DA3DEE59-56D5-4275-8334-F499AD119299}" type="datetimeFigureOut">
               <a:rPr lang="en-US" smtClean="0"/>
-              <a:t>4/4/2019</a:t>
+              <a:t>4/11/2019</a:t>
             </a:fld>
             <a:endParaRPr lang="en-US"/>
           </a:p>
@@ -1013,7 +1013,7 @@
           <a:p>
             <a:fld id="{DA3DEE59-56D5-4275-8334-F499AD119299}" type="datetimeFigureOut">
               <a:rPr lang="en-US" smtClean="0"/>
-              <a:t>4/4/2019</a:t>
+              <a:t>4/11/2019</a:t>
             </a:fld>
             <a:endParaRPr lang="en-US"/>
           </a:p>
@@ -1245,7 +1245,7 @@
           <a:p>
             <a:fld id="{DA3DEE59-56D5-4275-8334-F499AD119299}" type="datetimeFigureOut">
               <a:rPr lang="en-US" smtClean="0"/>
-              <a:t>4/4/2019</a:t>
+              <a:t>4/11/2019</a:t>
             </a:fld>
             <a:endParaRPr lang="en-US"/>
           </a:p>
@@ -1612,7 +1612,7 @@
           <a:p>
             <a:fld id="{DA3DEE59-56D5-4275-8334-F499AD119299}" type="datetimeFigureOut">
               <a:rPr lang="en-US" smtClean="0"/>
-              <a:t>4/4/2019</a:t>
+              <a:t>4/11/2019</a:t>
             </a:fld>
             <a:endParaRPr lang="en-US"/>
           </a:p>
@@ -1730,7 +1730,7 @@
           <a:p>
             <a:fld id="{DA3DEE59-56D5-4275-8334-F499AD119299}" type="datetimeFigureOut">
               <a:rPr lang="en-US" smtClean="0"/>
-              <a:t>4/4/2019</a:t>
+              <a:t>4/11/2019</a:t>
             </a:fld>
             <a:endParaRPr lang="en-US"/>
           </a:p>
@@ -1825,7 +1825,7 @@
           <a:p>
             <a:fld id="{DA3DEE59-56D5-4275-8334-F499AD119299}" type="datetimeFigureOut">
               <a:rPr lang="en-US" smtClean="0"/>
-              <a:t>4/4/2019</a:t>
+              <a:t>4/11/2019</a:t>
             </a:fld>
             <a:endParaRPr lang="en-US"/>
           </a:p>
@@ -2102,7 +2102,7 @@
           <a:p>
             <a:fld id="{DA3DEE59-56D5-4275-8334-F499AD119299}" type="datetimeFigureOut">
               <a:rPr lang="en-US" smtClean="0"/>
-              <a:t>4/4/2019</a:t>
+              <a:t>4/11/2019</a:t>
             </a:fld>
             <a:endParaRPr lang="en-US"/>
           </a:p>
@@ -2355,7 +2355,7 @@
           <a:p>
             <a:fld id="{DA3DEE59-56D5-4275-8334-F499AD119299}" type="datetimeFigureOut">
               <a:rPr lang="en-US" smtClean="0"/>
-              <a:t>4/4/2019</a:t>
+              <a:t>4/11/2019</a:t>
             </a:fld>
             <a:endParaRPr lang="en-US"/>
           </a:p>
@@ -2568,7 +2568,7 @@
           <a:p>
             <a:fld id="{DA3DEE59-56D5-4275-8334-F499AD119299}" type="datetimeFigureOut">
               <a:rPr lang="en-US" smtClean="0"/>
-              <a:t>4/4/2019</a:t>
+              <a:t>4/11/2019</a:t>
             </a:fld>
             <a:endParaRPr lang="en-US"/>
           </a:p>
@@ -2998,7 +2998,7 @@
           <a:graphicData uri="http://schemas.openxmlformats.org/presentationml/2006/ole">
             <mc:AlternateContent xmlns:mc="http://schemas.openxmlformats.org/markup-compatibility/2006">
               <mc:Choice xmlns:v="urn:schemas-microsoft-com:vml" Requires="v">
-                <p:oleObj spid="_x0000_s2083" name="think-cell Folie" r:id="rId4" imgW="631" imgH="631" progId="TCLayout.ActiveDocument.1">
+                <p:oleObj spid="_x0000_s2090" name="think-cell Folie" r:id="rId4" imgW="631" imgH="631" progId="TCLayout.ActiveDocument.1">
                   <p:embed/>
                 </p:oleObj>
               </mc:Choice>
@@ -4514,7 +4514,7 @@
       </p:pic>
       <p:pic>
         <p:nvPicPr>
-          <p:cNvPr id="33" name="Grafik 32"/>
+          <p:cNvPr id="47" name="Grafik 46"/>
           <p:cNvPicPr>
             <a:picLocks noChangeAspect="1"/>
           </p:cNvPicPr>
@@ -4528,8 +4528,8 @@
         </p:blipFill>
         <p:spPr>
           <a:xfrm>
-            <a:off x="4008712" y="620770"/>
-            <a:ext cx="7924800" cy="476250"/>
+            <a:off x="4002534" y="620770"/>
+            <a:ext cx="7937500" cy="476250"/>
           </a:xfrm>
           <a:prstGeom prst="rect">
             <a:avLst/>
@@ -4584,13 +4584,7 @@
               <a:rPr lang="de-DE" sz="1600" dirty="0" smtClean="0">
                 <a:latin typeface="Bauhaus 93" panose="04030905020B02020C02" pitchFamily="82" charset="0"/>
               </a:rPr>
-              <a:t>für </a:t>
-            </a:r>
-            <a:r>
-              <a:rPr lang="de-DE" sz="1600" dirty="0" smtClean="0">
-                <a:latin typeface="Bauhaus 93" panose="04030905020B02020C02" pitchFamily="82" charset="0"/>
-              </a:rPr>
-              <a:t>PowerPoint-</a:t>
+              <a:t>für PowerPoint-</a:t>
             </a:r>
             <a:r>
               <a:rPr lang="de-DE" sz="1600" dirty="0" err="1" smtClean="0">
@@ -4836,15 +4830,7 @@
               </a:pPr>
               <a:r>
                 <a:rPr lang="de-DE" sz="1200" i="1" dirty="0" smtClean="0"/>
-                <a:t>Werden definiert </a:t>
-              </a:r>
-              <a:r>
-                <a:rPr lang="de-DE" sz="1200" i="1" dirty="0" smtClean="0"/>
-                <a:t>durch </a:t>
-              </a:r>
-              <a:r>
-                <a:rPr lang="de-DE" sz="1200" i="1" dirty="0" smtClean="0"/>
-                <a:t>das Farbschema im Master-Template</a:t>
+                <a:t>Werden definiert durch das Farbschema im Master-Template</a:t>
               </a:r>
               <a:endParaRPr lang="de-DE" sz="1200" i="1" dirty="0"/>
             </a:p>
@@ -4896,15 +4882,7 @@
               </a:pPr>
               <a:r>
                 <a:rPr lang="de-DE" sz="1200" i="1" dirty="0" smtClean="0"/>
-                <a:t>Werden in </a:t>
-              </a:r>
-              <a:r>
-                <a:rPr lang="de-DE" sz="1200" i="1" dirty="0" smtClean="0"/>
-                <a:t>der </a:t>
-              </a:r>
-              <a:r>
-                <a:rPr lang="de-DE" sz="1200" i="1" dirty="0" smtClean="0"/>
-                <a:t>Präsentation gespeichert (nur RGB-Werte)</a:t>
+                <a:t>Werden in der Präsentation gespeichert (nur RGB-Werte)</a:t>
               </a:r>
               <a:endParaRPr lang="de-DE" sz="1200" i="1" dirty="0"/>
             </a:p>
@@ -4956,11 +4934,7 @@
               </a:pPr>
               <a:r>
                 <a:rPr lang="de-DE" sz="1200" i="1" dirty="0" smtClean="0"/>
-                <a:t>Frei </a:t>
-              </a:r>
-              <a:r>
-                <a:rPr lang="de-DE" sz="1200" i="1" dirty="0" smtClean="0"/>
-                <a:t>wählbare Farben, die in den BKT-Einstellungen gespeichert werden</a:t>
+                <a:t>Frei wählbare Farben, die in den BKT-Einstellungen gespeichert werden</a:t>
               </a:r>
               <a:endParaRPr lang="de-DE" sz="1200" i="1" dirty="0"/>
             </a:p>
@@ -5033,7 +5007,7 @@
         </p:nvSpPr>
         <p:spPr>
           <a:xfrm>
-            <a:off x="11785590" y="597910"/>
+            <a:off x="11797946" y="597910"/>
             <a:ext cx="180000" cy="180000"/>
           </a:xfrm>
           <a:prstGeom prst="ellipse">
@@ -5091,7 +5065,7 @@
         </p:nvSpPr>
         <p:spPr>
           <a:xfrm>
-            <a:off x="10982165" y="286240"/>
+            <a:off x="10994521" y="286240"/>
             <a:ext cx="803425" cy="276999"/>
           </a:xfrm>
           <a:prstGeom prst="rect">
@@ -5154,7 +5128,7 @@
         </p:nvCxnSpPr>
         <p:spPr>
           <a:xfrm rot="16200000" flipV="1">
-            <a:off x="11744005" y="466325"/>
+            <a:off x="11756361" y="466325"/>
             <a:ext cx="173170" cy="90000"/>
           </a:xfrm>
           <a:prstGeom prst="bentConnector2">
@@ -6096,7 +6070,7 @@
             </p:custDataLst>
             <p:extLst>
               <p:ext uri="{D42A27DB-BD31-4B8C-83A1-F6EECF244321}">
-                <p14:modId xmlns:p14="http://schemas.microsoft.com/office/powerpoint/2010/main" val="3021139417"/>
+                <p14:modId xmlns:p14="http://schemas.microsoft.com/office/powerpoint/2010/main" val="211487899"/>
               </p:ext>
             </p:extLst>
           </p:nvPr>
@@ -6109,7 +6083,7 @@
           <a:graphicData uri="http://schemas.openxmlformats.org/presentationml/2006/ole">
             <mc:AlternateContent xmlns:mc="http://schemas.openxmlformats.org/markup-compatibility/2006">
               <mc:Choice xmlns:v="urn:schemas-microsoft-com:vml" Requires="v">
-                <p:oleObj spid="_x0000_s3091" name="think-cell Folie" r:id="rId4" imgW="631" imgH="631" progId="TCLayout.ActiveDocument.1">
+                <p:oleObj spid="_x0000_s3098" name="think-cell Folie" r:id="rId4" imgW="631" imgH="631" progId="TCLayout.ActiveDocument.1">
                   <p:embed/>
                 </p:oleObj>
               </mc:Choice>
@@ -6144,94 +6118,9 @@
           </a:graphicData>
         </a:graphic>
       </p:graphicFrame>
-      <p:sp>
-        <p:nvSpPr>
-          <p:cNvPr id="110" name="Rechteck 109"/>
-          <p:cNvSpPr/>
-          <p:nvPr/>
-        </p:nvSpPr>
-        <p:spPr>
-          <a:xfrm>
-            <a:off x="2942134" y="4863578"/>
-            <a:ext cx="694338" cy="411480"/>
-          </a:xfrm>
-          <a:prstGeom prst="rect">
-            <a:avLst/>
-          </a:prstGeom>
-        </p:spPr>
-        <p:style>
-          <a:lnRef idx="2">
-            <a:schemeClr val="accent1">
-              <a:shade val="50000"/>
-            </a:schemeClr>
-          </a:lnRef>
-          <a:fillRef idx="1">
-            <a:schemeClr val="accent1"/>
-          </a:fillRef>
-          <a:effectRef idx="0">
-            <a:schemeClr val="accent1"/>
-          </a:effectRef>
-          <a:fontRef idx="minor">
-            <a:schemeClr val="lt1"/>
-          </a:fontRef>
-        </p:style>
-        <p:txBody>
-          <a:bodyPr rtlCol="0" anchor="ctr"/>
-          <a:lstStyle/>
-          <a:p>
-            <a:pPr algn="ctr"/>
-            <a:endParaRPr lang="de-DE"/>
-          </a:p>
-        </p:txBody>
-      </p:sp>
-      <p:sp>
-        <p:nvSpPr>
-          <p:cNvPr id="115" name="Rechteck 114"/>
-          <p:cNvSpPr/>
-          <p:nvPr/>
-        </p:nvSpPr>
-        <p:spPr>
-          <a:xfrm>
-            <a:off x="3284688" y="5059058"/>
-            <a:ext cx="694338" cy="411480"/>
-          </a:xfrm>
-          <a:prstGeom prst="rect">
-            <a:avLst/>
-          </a:prstGeom>
-          <a:solidFill>
-            <a:schemeClr val="accent1">
-              <a:alpha val="90000"/>
-            </a:schemeClr>
-          </a:solidFill>
-        </p:spPr>
-        <p:style>
-          <a:lnRef idx="2">
-            <a:schemeClr val="accent1">
-              <a:shade val="50000"/>
-            </a:schemeClr>
-          </a:lnRef>
-          <a:fillRef idx="1">
-            <a:schemeClr val="accent1"/>
-          </a:fillRef>
-          <a:effectRef idx="0">
-            <a:schemeClr val="accent1"/>
-          </a:effectRef>
-          <a:fontRef idx="minor">
-            <a:schemeClr val="lt1"/>
-          </a:fontRef>
-        </p:style>
-        <p:txBody>
-          <a:bodyPr rtlCol="0" anchor="ctr"/>
-          <a:lstStyle/>
-          <a:p>
-            <a:pPr algn="ctr"/>
-            <a:endParaRPr lang="de-DE"/>
-          </a:p>
-        </p:txBody>
-      </p:sp>
       <p:pic>
         <p:nvPicPr>
-          <p:cNvPr id="30" name="Grafik 29"/>
+          <p:cNvPr id="19" name="Grafik 18"/>
           <p:cNvPicPr>
             <a:picLocks noChangeAspect="1"/>
           </p:cNvPicPr>
@@ -6244,18 +6133,142 @@
           </a:stretch>
         </p:blipFill>
         <p:spPr>
-          <a:xfrm flipH="1">
-            <a:off x="132172" y="2467993"/>
-            <a:ext cx="176213" cy="4024313"/>
+          <a:xfrm>
+            <a:off x="3897310" y="0"/>
+            <a:ext cx="484009" cy="535500"/>
           </a:xfrm>
           <a:prstGeom prst="rect">
             <a:avLst/>
           </a:prstGeom>
         </p:spPr>
       </p:pic>
+      <p:sp>
+        <p:nvSpPr>
+          <p:cNvPr id="12" name="Rechteck 11"/>
+          <p:cNvSpPr/>
+          <p:nvPr/>
+        </p:nvSpPr>
+        <p:spPr>
+          <a:xfrm>
+            <a:off x="5027767" y="784065"/>
+            <a:ext cx="193480" cy="193480"/>
+          </a:xfrm>
+          <a:prstGeom prst="rect">
+            <a:avLst/>
+          </a:prstGeom>
+          <a:solidFill>
+            <a:srgbClr val="FF0000"/>
+          </a:solidFill>
+          <a:ln w="12700" cap="flat" cmpd="sng" algn="ctr">
+            <a:noFill/>
+            <a:prstDash val="solid"/>
+            <a:miter lim="800000"/>
+          </a:ln>
+          <a:effectLst/>
+          <a:extLst>
+            <a:ext uri="{91240B29-F687-4F45-9708-019B960494DF}">
+              <a14:hiddenLine xmlns:a14="http://schemas.microsoft.com/office/drawing/2010/main" w="12700" cap="flat" cmpd="sng" algn="ctr">
+                <a:solidFill>
+                  <a:schemeClr val="accent1">
+                    <a:shade val="50000"/>
+                  </a:schemeClr>
+                </a:solidFill>
+                <a:prstDash val="solid"/>
+                <a:miter lim="800000"/>
+              </a14:hiddenLine>
+            </a:ext>
+          </a:extLst>
+        </p:spPr>
+        <p:style>
+          <a:lnRef idx="2">
+            <a:schemeClr val="accent1">
+              <a:shade val="50000"/>
+            </a:schemeClr>
+          </a:lnRef>
+          <a:fillRef idx="1">
+            <a:schemeClr val="accent1"/>
+          </a:fillRef>
+          <a:effectRef idx="0">
+            <a:schemeClr val="accent1"/>
+          </a:effectRef>
+          <a:fontRef idx="minor">
+            <a:schemeClr val="lt1"/>
+          </a:fontRef>
+        </p:style>
+        <p:txBody>
+          <a:bodyPr rtlCol="0" anchor="ctr"/>
+          <a:lstStyle/>
+          <a:p>
+            <a:pPr algn="ctr"/>
+            <a:endParaRPr lang="en-US"/>
+          </a:p>
+        </p:txBody>
+      </p:sp>
+      <p:sp>
+        <p:nvSpPr>
+          <p:cNvPr id="71" name="Rechteck 70"/>
+          <p:cNvSpPr/>
+          <p:nvPr/>
+        </p:nvSpPr>
+        <p:spPr>
+          <a:xfrm>
+            <a:off x="8344428" y="784065"/>
+            <a:ext cx="193480" cy="193480"/>
+          </a:xfrm>
+          <a:prstGeom prst="rect">
+            <a:avLst/>
+          </a:prstGeom>
+          <a:solidFill>
+            <a:srgbClr val="FF0000"/>
+          </a:solidFill>
+          <a:ln w="12700" cap="flat" cmpd="sng" algn="ctr">
+            <a:noFill/>
+            <a:prstDash val="solid"/>
+            <a:miter lim="800000"/>
+          </a:ln>
+          <a:effectLst/>
+          <a:extLst>
+            <a:ext uri="{91240B29-F687-4F45-9708-019B960494DF}">
+              <a14:hiddenLine xmlns:a14="http://schemas.microsoft.com/office/drawing/2010/main" w="12700" cap="flat" cmpd="sng" algn="ctr">
+                <a:solidFill>
+                  <a:schemeClr val="accent1">
+                    <a:shade val="50000"/>
+                  </a:schemeClr>
+                </a:solidFill>
+                <a:prstDash val="solid"/>
+                <a:miter lim="800000"/>
+              </a14:hiddenLine>
+            </a:ext>
+          </a:extLst>
+        </p:spPr>
+        <p:style>
+          <a:lnRef idx="2">
+            <a:schemeClr val="accent1">
+              <a:shade val="50000"/>
+            </a:schemeClr>
+          </a:lnRef>
+          <a:fillRef idx="1">
+            <a:schemeClr val="accent1"/>
+          </a:fillRef>
+          <a:effectRef idx="0">
+            <a:schemeClr val="accent1"/>
+          </a:effectRef>
+          <a:fontRef idx="minor">
+            <a:schemeClr val="lt1"/>
+          </a:fontRef>
+        </p:style>
+        <p:txBody>
+          <a:bodyPr rtlCol="0" anchor="ctr"/>
+          <a:lstStyle/>
+          <a:p>
+            <a:pPr algn="ctr"/>
+            <a:endParaRPr lang="en-US"/>
+          </a:p>
+        </p:txBody>
+      </p:sp>
       <p:pic>
         <p:nvPicPr>
-          <p:cNvPr id="31" name="Grafik 30"/>
+          <p:cNvPr id="16" name="Grafik 15"/>
           <p:cNvPicPr>
             <a:picLocks noChangeAspect="1"/>
           </p:cNvPicPr>
@@ -6269,17 +6282,102 @@
         </p:blipFill>
         <p:spPr>
           <a:xfrm>
-            <a:off x="374865" y="5968431"/>
-            <a:ext cx="1343025" cy="523875"/>
+            <a:off x="4002534" y="620770"/>
+            <a:ext cx="7937500" cy="476250"/>
           </a:xfrm>
           <a:prstGeom prst="rect">
             <a:avLst/>
           </a:prstGeom>
         </p:spPr>
       </p:pic>
+      <p:sp>
+        <p:nvSpPr>
+          <p:cNvPr id="110" name="Rechteck 109"/>
+          <p:cNvSpPr/>
+          <p:nvPr/>
+        </p:nvSpPr>
+        <p:spPr>
+          <a:xfrm>
+            <a:off x="2979202" y="4863578"/>
+            <a:ext cx="694338" cy="411480"/>
+          </a:xfrm>
+          <a:prstGeom prst="rect">
+            <a:avLst/>
+          </a:prstGeom>
+        </p:spPr>
+        <p:style>
+          <a:lnRef idx="2">
+            <a:schemeClr val="accent1">
+              <a:shade val="50000"/>
+            </a:schemeClr>
+          </a:lnRef>
+          <a:fillRef idx="1">
+            <a:schemeClr val="accent1"/>
+          </a:fillRef>
+          <a:effectRef idx="0">
+            <a:schemeClr val="accent1"/>
+          </a:effectRef>
+          <a:fontRef idx="minor">
+            <a:schemeClr val="lt1"/>
+          </a:fontRef>
+        </p:style>
+        <p:txBody>
+          <a:bodyPr rtlCol="0" anchor="ctr"/>
+          <a:lstStyle/>
+          <a:p>
+            <a:pPr algn="ctr"/>
+            <a:endParaRPr lang="de-DE"/>
+          </a:p>
+        </p:txBody>
+      </p:sp>
+      <p:sp>
+        <p:nvSpPr>
+          <p:cNvPr id="115" name="Rechteck 114"/>
+          <p:cNvSpPr/>
+          <p:nvPr/>
+        </p:nvSpPr>
+        <p:spPr>
+          <a:xfrm>
+            <a:off x="3321756" y="5059058"/>
+            <a:ext cx="694338" cy="411480"/>
+          </a:xfrm>
+          <a:prstGeom prst="rect">
+            <a:avLst/>
+          </a:prstGeom>
+          <a:solidFill>
+            <a:schemeClr val="accent1">
+              <a:alpha val="90000"/>
+            </a:schemeClr>
+          </a:solidFill>
+        </p:spPr>
+        <p:style>
+          <a:lnRef idx="2">
+            <a:schemeClr val="accent1">
+              <a:shade val="50000"/>
+            </a:schemeClr>
+          </a:lnRef>
+          <a:fillRef idx="1">
+            <a:schemeClr val="accent1"/>
+          </a:fillRef>
+          <a:effectRef idx="0">
+            <a:schemeClr val="accent1"/>
+          </a:effectRef>
+          <a:fontRef idx="minor">
+            <a:schemeClr val="lt1"/>
+          </a:fontRef>
+        </p:style>
+        <p:txBody>
+          <a:bodyPr rtlCol="0" anchor="ctr"/>
+          <a:lstStyle/>
+          <a:p>
+            <a:pPr algn="ctr"/>
+            <a:endParaRPr lang="de-DE"/>
+          </a:p>
+        </p:txBody>
+      </p:sp>
       <p:pic>
         <p:nvPicPr>
-          <p:cNvPr id="32" name="Grafik 31"/>
+          <p:cNvPr id="30" name="Grafik 29"/>
           <p:cNvPicPr>
             <a:picLocks noChangeAspect="1"/>
           </p:cNvPicPr>
@@ -6292,9 +6390,9 @@
           </a:stretch>
         </p:blipFill>
         <p:spPr>
-          <a:xfrm>
-            <a:off x="374865" y="4490490"/>
-            <a:ext cx="461963" cy="1404938"/>
+          <a:xfrm flipH="1">
+            <a:off x="132172" y="2467993"/>
+            <a:ext cx="176213" cy="4024313"/>
           </a:xfrm>
           <a:prstGeom prst="rect">
             <a:avLst/>
@@ -6303,7 +6401,7 @@
       </p:pic>
       <p:pic>
         <p:nvPicPr>
-          <p:cNvPr id="33" name="Grafik 32"/>
+          <p:cNvPr id="31" name="Grafik 30"/>
           <p:cNvPicPr>
             <a:picLocks noChangeAspect="1"/>
           </p:cNvPicPr>
@@ -6317,8 +6415,32 @@
         </p:blipFill>
         <p:spPr>
           <a:xfrm>
-            <a:off x="4008712" y="620770"/>
-            <a:ext cx="7924800" cy="476250"/>
+            <a:off x="374865" y="5968431"/>
+            <a:ext cx="1343025" cy="523875"/>
+          </a:xfrm>
+          <a:prstGeom prst="rect">
+            <a:avLst/>
+          </a:prstGeom>
+        </p:spPr>
+      </p:pic>
+      <p:pic>
+        <p:nvPicPr>
+          <p:cNvPr id="32" name="Grafik 31"/>
+          <p:cNvPicPr>
+            <a:picLocks noChangeAspect="1"/>
+          </p:cNvPicPr>
+          <p:nvPr/>
+        </p:nvPicPr>
+        <p:blipFill>
+          <a:blip r:embed="rId10"/>
+          <a:stretch>
+            <a:fillRect/>
+          </a:stretch>
+        </p:blipFill>
+        <p:spPr>
+          <a:xfrm>
+            <a:off x="374865" y="4490490"/>
+            <a:ext cx="461963" cy="1404938"/>
           </a:xfrm>
           <a:prstGeom prst="rect">
             <a:avLst/>
@@ -7050,7 +7172,7 @@
         </p:nvGrpSpPr>
         <p:grpSpPr>
           <a:xfrm>
-            <a:off x="2942134" y="2974049"/>
+            <a:off x="2979202" y="2974049"/>
             <a:ext cx="632605" cy="843473"/>
             <a:chOff x="4651200" y="1360800"/>
             <a:chExt cx="993600" cy="1324800"/>
@@ -7283,7 +7405,7 @@
         </p:nvSpPr>
         <p:spPr>
           <a:xfrm>
-            <a:off x="2939068" y="1546860"/>
+            <a:off x="2976136" y="1546860"/>
             <a:ext cx="2410172" cy="1227476"/>
           </a:xfrm>
           <a:prstGeom prst="rect">
@@ -7319,13 +7441,8 @@
             </a:pPr>
             <a:r>
               <a:rPr lang="de-DE" sz="1200" dirty="0" smtClean="0"/>
-              <a:t>Farbe entfernen (</a:t>
-            </a:r>
-            <a:r>
-              <a:rPr lang="de-DE" sz="1200" dirty="0" smtClean="0"/>
-              <a:t>durchsichtig); je nach Tastenkombination wird Hintergrund, Linie oder Text farblos</a:t>
-            </a:r>
-            <a:endParaRPr lang="de-DE" sz="1200" dirty="0" smtClean="0"/>
+              <a:t>Farbe entfernen (durchsichtig); je nach Tastenkombination wird Hintergrund, Linie oder Text farblos</a:t>
+            </a:r>
           </a:p>
         </p:txBody>
       </p:sp>
@@ -7337,7 +7454,7 @@
         </p:nvSpPr>
         <p:spPr>
           <a:xfrm>
-            <a:off x="5565849" y="1546860"/>
+            <a:off x="5602917" y="1546860"/>
             <a:ext cx="2410172" cy="1227476"/>
           </a:xfrm>
           <a:prstGeom prst="rect">
@@ -7362,17 +7479,8 @@
             </a:pPr>
             <a:r>
               <a:rPr lang="de-DE" sz="1200" b="1" dirty="0" smtClean="0"/>
-              <a:t>Farbe </a:t>
-            </a:r>
-            <a:r>
-              <a:rPr lang="de-DE" sz="1200" b="1" dirty="0" smtClean="0"/>
-              <a:t>hinzufügen</a:t>
-            </a:r>
-            <a:r>
-              <a:rPr lang="de-DE" sz="1200" b="1" dirty="0" smtClean="0"/>
-              <a:t>:</a:t>
-            </a:r>
-            <a:endParaRPr lang="de-DE" sz="1200" b="1" dirty="0" smtClean="0"/>
+              <a:t>Farbe hinzufügen:</a:t>
+            </a:r>
           </a:p>
           <a:p>
             <a:pPr>
@@ -7382,11 +7490,7 @@
             </a:pPr>
             <a:r>
               <a:rPr lang="de-DE" sz="1200" dirty="0" smtClean="0"/>
-              <a:t>Hintergrundfarbe </a:t>
-            </a:r>
-            <a:r>
-              <a:rPr lang="de-DE" sz="1200" dirty="0" smtClean="0"/>
-              <a:t>des aktiven Shapes zu zuletzt genutzten Farben hinzufügen (max. 10, „älteste“ Farbe wird automatisch entfernt)</a:t>
+              <a:t>Hintergrundfarbe des aktiven Shapes zu zuletzt genutzten Farben hinzufügen (max. 10, „älteste“ Farbe wird automatisch entfernt)</a:t>
             </a:r>
             <a:endParaRPr lang="de-DE" sz="1200" dirty="0"/>
           </a:p>
@@ -7400,7 +7504,7 @@
         </p:nvSpPr>
         <p:spPr>
           <a:xfrm>
-            <a:off x="8189233" y="1546860"/>
+            <a:off x="8226301" y="1546860"/>
             <a:ext cx="2410172" cy="1227476"/>
           </a:xfrm>
           <a:prstGeom prst="rect">
@@ -7450,7 +7554,7 @@
         </p:nvSpPr>
         <p:spPr>
           <a:xfrm>
-            <a:off x="5565849" y="2951342"/>
+            <a:off x="5602917" y="2951342"/>
             <a:ext cx="604258" cy="414686"/>
           </a:xfrm>
           <a:prstGeom prst="rect">
@@ -7523,7 +7627,7 @@
         </p:nvSpPr>
         <p:spPr>
           <a:xfrm>
-            <a:off x="6227342" y="2951343"/>
+            <a:off x="6264410" y="2951343"/>
             <a:ext cx="1748679" cy="866180"/>
           </a:xfrm>
           <a:prstGeom prst="rect">
@@ -7565,7 +7669,7 @@
         </p:nvSpPr>
         <p:spPr>
           <a:xfrm>
-            <a:off x="8189233" y="2951342"/>
+            <a:off x="8226301" y="2951342"/>
             <a:ext cx="604258" cy="414686"/>
           </a:xfrm>
           <a:prstGeom prst="rect">
@@ -7638,7 +7742,7 @@
         </p:nvSpPr>
         <p:spPr>
           <a:xfrm>
-            <a:off x="8850726" y="2951343"/>
+            <a:off x="8887794" y="2951343"/>
             <a:ext cx="1748679" cy="866180"/>
           </a:xfrm>
           <a:prstGeom prst="rect">
@@ -7680,7 +7784,7 @@
         </p:nvSpPr>
         <p:spPr>
           <a:xfrm>
-            <a:off x="3618289" y="2951342"/>
+            <a:off x="3655357" y="2951342"/>
             <a:ext cx="1730952" cy="1015663"/>
           </a:xfrm>
           <a:prstGeom prst="rect">
@@ -7701,15 +7805,7 @@
             </a:pPr>
             <a:r>
               <a:rPr lang="de-DE" sz="1200" dirty="0" smtClean="0"/>
-              <a:t>Scrollrad während die Maus auf dem Button ist ändert die </a:t>
-            </a:r>
-            <a:r>
-              <a:rPr lang="de-DE" sz="1200" dirty="0" smtClean="0"/>
-              <a:t>Hintergrund-Transparenz </a:t>
-            </a:r>
-            <a:r>
-              <a:rPr lang="de-DE" sz="1200" dirty="0" smtClean="0"/>
-              <a:t>selektierter Shapes in 10%-Schritten</a:t>
+              <a:t>Scrollrad während die Maus auf dem Button ist ändert die Hintergrund-Transparenz selektierter Shapes in 10%-Schritten</a:t>
             </a:r>
             <a:endParaRPr lang="de-DE" sz="1200" dirty="0"/>
           </a:p>
@@ -7726,8 +7822,8 @@
         </p:nvCxnSpPr>
         <p:spPr>
           <a:xfrm>
-            <a:off x="4144154" y="1019695"/>
-            <a:ext cx="0" cy="527165"/>
+            <a:off x="4181222" y="1056229"/>
+            <a:ext cx="0" cy="490631"/>
           </a:xfrm>
           <a:prstGeom prst="straightConnector1">
             <a:avLst/>
@@ -7766,8 +7862,8 @@
         </p:nvCxnSpPr>
         <p:spPr>
           <a:xfrm>
-            <a:off x="6770935" y="1019695"/>
-            <a:ext cx="0" cy="527165"/>
+            <a:off x="6808003" y="1025339"/>
+            <a:ext cx="0" cy="521521"/>
           </a:xfrm>
           <a:prstGeom prst="straightConnector1">
             <a:avLst/>
@@ -7806,8 +7902,8 @@
         </p:nvCxnSpPr>
         <p:spPr>
           <a:xfrm>
-            <a:off x="9394319" y="1019695"/>
-            <a:ext cx="0" cy="527165"/>
+            <a:off x="9431387" y="1056229"/>
+            <a:ext cx="0" cy="490631"/>
           </a:xfrm>
           <a:prstGeom prst="straightConnector1">
             <a:avLst/>
@@ -7845,8 +7941,8 @@
         </p:nvSpPr>
         <p:spPr>
           <a:xfrm>
-            <a:off x="9286319" y="803695"/>
-            <a:ext cx="216000" cy="216000"/>
+            <a:off x="9305387" y="804229"/>
+            <a:ext cx="252000" cy="252000"/>
           </a:xfrm>
           <a:prstGeom prst="ellipse">
             <a:avLst/>
@@ -7905,8 +8001,8 @@
         </p:nvSpPr>
         <p:spPr>
           <a:xfrm>
-            <a:off x="6662935" y="803695"/>
-            <a:ext cx="216000" cy="216000"/>
+            <a:off x="6682003" y="773339"/>
+            <a:ext cx="252000" cy="252000"/>
           </a:xfrm>
           <a:prstGeom prst="ellipse">
             <a:avLst/>
@@ -7965,8 +8061,8 @@
         </p:nvSpPr>
         <p:spPr>
           <a:xfrm>
-            <a:off x="4036154" y="803695"/>
-            <a:ext cx="216000" cy="216000"/>
+            <a:off x="4055222" y="804229"/>
+            <a:ext cx="252000" cy="252000"/>
           </a:xfrm>
           <a:prstGeom prst="ellipse">
             <a:avLst/>
@@ -8024,14 +8120,14 @@
           <p:nvPr/>
         </p:nvPicPr>
         <p:blipFill>
-          <a:blip r:embed="rId10"/>
+          <a:blip r:embed="rId11"/>
           <a:stretch>
             <a:fillRect/>
           </a:stretch>
         </p:blipFill>
         <p:spPr>
           <a:xfrm>
-            <a:off x="7034843" y="4389040"/>
+            <a:off x="7071911" y="4389040"/>
             <a:ext cx="2665095" cy="1813869"/>
           </a:xfrm>
           <a:prstGeom prst="rect">
@@ -8050,7 +8146,7 @@
         </p:nvCxnSpPr>
         <p:spPr>
           <a:xfrm>
-            <a:off x="7101682" y="3817523"/>
+            <a:off x="7138750" y="3817523"/>
             <a:ext cx="1265709" cy="571517"/>
           </a:xfrm>
           <a:prstGeom prst="line">
@@ -8090,7 +8186,7 @@
         </p:nvCxnSpPr>
         <p:spPr>
           <a:xfrm flipH="1">
-            <a:off x="8367391" y="3817523"/>
+            <a:off x="8404459" y="3817523"/>
             <a:ext cx="1357675" cy="571517"/>
           </a:xfrm>
           <a:prstGeom prst="line">
@@ -8127,7 +8223,7 @@
         </p:nvSpPr>
         <p:spPr>
           <a:xfrm>
-            <a:off x="3627242" y="5254538"/>
+            <a:off x="3664310" y="5254538"/>
             <a:ext cx="694338" cy="411480"/>
           </a:xfrm>
           <a:prstGeom prst="rect">
@@ -8172,7 +8268,7 @@
         </p:nvSpPr>
         <p:spPr>
           <a:xfrm>
-            <a:off x="3969796" y="5450018"/>
+            <a:off x="4006864" y="5450018"/>
             <a:ext cx="694338" cy="411480"/>
           </a:xfrm>
           <a:prstGeom prst="rect">
@@ -8217,7 +8313,7 @@
         </p:nvSpPr>
         <p:spPr>
           <a:xfrm>
-            <a:off x="4312350" y="5645498"/>
+            <a:off x="4349418" y="5645498"/>
             <a:ext cx="694338" cy="411480"/>
           </a:xfrm>
           <a:prstGeom prst="rect">
@@ -8262,7 +8358,7 @@
         </p:nvSpPr>
         <p:spPr>
           <a:xfrm>
-            <a:off x="4654903" y="5840978"/>
+            <a:off x="4691971" y="5840978"/>
             <a:ext cx="694338" cy="411480"/>
           </a:xfrm>
           <a:prstGeom prst="rect">
@@ -8307,7 +8403,7 @@
         </p:nvSpPr>
         <p:spPr>
           <a:xfrm>
-            <a:off x="2956307" y="4050130"/>
+            <a:off x="2993375" y="4050130"/>
             <a:ext cx="604258" cy="414686"/>
           </a:xfrm>
           <a:prstGeom prst="rect">
@@ -8380,7 +8476,7 @@
         </p:nvSpPr>
         <p:spPr>
           <a:xfrm>
-            <a:off x="3200728" y="3799007"/>
+            <a:off x="3237796" y="3799007"/>
             <a:ext cx="115416" cy="276999"/>
           </a:xfrm>
           <a:prstGeom prst="rect">
@@ -8411,7 +8507,7 @@
         </p:nvSpPr>
         <p:spPr>
           <a:xfrm>
-            <a:off x="3618289" y="4050130"/>
+            <a:off x="3655357" y="4050130"/>
             <a:ext cx="1730952" cy="674368"/>
           </a:xfrm>
           <a:prstGeom prst="rect">
@@ -8469,6 +8565,183 @@
           </a:p>
         </p:txBody>
       </p:sp>
+      <p:sp>
+        <p:nvSpPr>
+          <p:cNvPr id="53" name="Textfeld 52"/>
+          <p:cNvSpPr txBox="1"/>
+          <p:nvPr/>
+        </p:nvSpPr>
+        <p:spPr>
+          <a:xfrm>
+            <a:off x="4649376" y="110932"/>
+            <a:ext cx="4890011" cy="405683"/>
+          </a:xfrm>
+          <a:prstGeom prst="rect">
+            <a:avLst/>
+          </a:prstGeom>
+          <a:noFill/>
+          <a:ln>
+            <a:solidFill>
+              <a:schemeClr val="bg2">
+                <a:lumMod val="100000"/>
+              </a:schemeClr>
+            </a:solidFill>
+          </a:ln>
+        </p:spPr>
+        <p:txBody>
+          <a:bodyPr wrap="square" lIns="0" tIns="36000" rIns="0" bIns="0" rtlCol="0">
+            <a:spAutoFit/>
+          </a:bodyPr>
+          <a:lstStyle/>
+          <a:p>
+            <a:pPr algn="ctr"/>
+            <a:r>
+              <a:rPr lang="de-DE" sz="1200" dirty="0" smtClean="0"/>
+              <a:t>Ist ein einzelnes Shapes markiert, geben die </a:t>
+            </a:r>
+            <a:r>
+              <a:rPr lang="de-DE" sz="1200" b="1" dirty="0" smtClean="0"/>
+              <a:t>aktivierten Buttons </a:t>
+            </a:r>
+            <a:r>
+              <a:rPr lang="de-DE" sz="1200" dirty="0" smtClean="0"/>
+              <a:t>an, dass das Shape diese Farben als Hintergrundfarbe oder Linienfarbe verwendet.</a:t>
+            </a:r>
+            <a:endParaRPr lang="de-DE" sz="1200" dirty="0"/>
+          </a:p>
+        </p:txBody>
+      </p:sp>
+      <p:cxnSp>
+        <p:nvCxnSpPr>
+          <p:cNvPr id="54" name="Gerader Verbinder 49"/>
+          <p:cNvCxnSpPr>
+            <a:stCxn id="12" idx="0"/>
+            <a:endCxn id="53" idx="3"/>
+          </p:cNvCxnSpPr>
+          <p:nvPr/>
+        </p:nvCxnSpPr>
+        <p:spPr>
+          <a:xfrm rot="5400000" flipH="1" flipV="1">
+            <a:off x="7096802" y="-1658520"/>
+            <a:ext cx="470291" cy="4414880"/>
+          </a:xfrm>
+          <a:prstGeom prst="bentConnector4">
+            <a:avLst>
+              <a:gd name="adj1" fmla="val 45514"/>
+              <a:gd name="adj2" fmla="val 105178"/>
+            </a:avLst>
+          </a:prstGeom>
+          <a:ln>
+            <a:solidFill>
+              <a:schemeClr val="tx1">
+                <a:lumMod val="100000"/>
+              </a:schemeClr>
+            </a:solidFill>
+            <a:headEnd type="oval"/>
+          </a:ln>
+        </p:spPr>
+        <p:style>
+          <a:lnRef idx="1">
+            <a:schemeClr val="accent1"/>
+          </a:lnRef>
+          <a:fillRef idx="0">
+            <a:schemeClr val="accent1"/>
+          </a:fillRef>
+          <a:effectRef idx="0">
+            <a:schemeClr val="accent1"/>
+          </a:effectRef>
+          <a:fontRef idx="minor">
+            <a:schemeClr val="tx1"/>
+          </a:fontRef>
+        </p:style>
+      </p:cxnSp>
+      <p:cxnSp>
+        <p:nvCxnSpPr>
+          <p:cNvPr id="59" name="Gerader Verbinder 49"/>
+          <p:cNvCxnSpPr>
+            <a:stCxn id="53" idx="3"/>
+            <a:endCxn id="71" idx="0"/>
+          </p:cNvCxnSpPr>
+          <p:nvPr/>
+        </p:nvCxnSpPr>
+        <p:spPr>
+          <a:xfrm flipH="1">
+            <a:off x="8441168" y="313774"/>
+            <a:ext cx="1098219" cy="470291"/>
+          </a:xfrm>
+          <a:prstGeom prst="bentConnector4">
+            <a:avLst>
+              <a:gd name="adj1" fmla="val -20816"/>
+              <a:gd name="adj2" fmla="val 54486"/>
+            </a:avLst>
+          </a:prstGeom>
+          <a:ln>
+            <a:solidFill>
+              <a:schemeClr val="tx1">
+                <a:lumMod val="100000"/>
+              </a:schemeClr>
+            </a:solidFill>
+            <a:headEnd type="none" w="med" len="med"/>
+            <a:tailEnd type="oval" w="med" len="med"/>
+          </a:ln>
+        </p:spPr>
+        <p:style>
+          <a:lnRef idx="1">
+            <a:schemeClr val="accent1"/>
+          </a:lnRef>
+          <a:fillRef idx="0">
+            <a:schemeClr val="accent1"/>
+          </a:fillRef>
+          <a:effectRef idx="0">
+            <a:schemeClr val="accent1"/>
+          </a:effectRef>
+          <a:fontRef idx="minor">
+            <a:schemeClr val="tx1"/>
+          </a:fontRef>
+        </p:style>
+      </p:cxnSp>
+      <p:cxnSp>
+        <p:nvCxnSpPr>
+          <p:cNvPr id="76" name="Gerader Verbinder 49"/>
+          <p:cNvCxnSpPr>
+            <a:cxnSpLocks/>
+            <a:endCxn id="53" idx="1"/>
+          </p:cNvCxnSpPr>
+          <p:nvPr/>
+        </p:nvCxnSpPr>
+        <p:spPr>
+          <a:xfrm>
+            <a:off x="4318931" y="313774"/>
+            <a:ext cx="330445" cy="0"/>
+          </a:xfrm>
+          <a:prstGeom prst="straightConnector1">
+            <a:avLst/>
+          </a:prstGeom>
+          <a:ln>
+            <a:solidFill>
+              <a:schemeClr val="tx1">
+                <a:lumMod val="100000"/>
+              </a:schemeClr>
+            </a:solidFill>
+            <a:headEnd type="none" w="med" len="med"/>
+            <a:tailEnd type="triangle" w="med" len="med"/>
+          </a:ln>
+        </p:spPr>
+        <p:style>
+          <a:lnRef idx="1">
+            <a:schemeClr val="accent1"/>
+          </a:lnRef>
+          <a:fillRef idx="0">
+            <a:schemeClr val="accent1"/>
+          </a:fillRef>
+          <a:effectRef idx="0">
+            <a:schemeClr val="accent1"/>
+          </a:effectRef>
+          <a:fontRef idx="minor">
+            <a:schemeClr val="tx1"/>
+          </a:fontRef>
+        </p:style>
+      </p:cxnSp>
     </p:spTree>
     <p:extLst>
       <p:ext uri="{BB962C8B-B14F-4D97-AF65-F5344CB8AC3E}">

</xml_diff>